<commit_message>
GF#21457 added CodeSystem to form curation diagram
added CodeSystem to form curation diagram in images (png) and image source (ppt)
</commit_message>
<xml_diff>
--- a/input/images-source/sdc-form-curation.pptx
+++ b/input/images-source/sdc-form-curation.pptx
@@ -303,7 +303,7 @@
             <a:fld id="{C69E31BE-431C-4F96-86FE-0099C953F73C}" type="datetimeFigureOut">
               <a:rPr lang="en-US" smtClean="0"/>
               <a:pPr/>
-              <a:t>8/28/2018</a:t>
+              <a:t>11/12/2019</a:t>
             </a:fld>
             <a:endParaRPr lang="en-US"/>
           </a:p>
@@ -473,7 +473,7 @@
             <a:fld id="{C69E31BE-431C-4F96-86FE-0099C953F73C}" type="datetimeFigureOut">
               <a:rPr lang="en-US" smtClean="0"/>
               <a:pPr/>
-              <a:t>8/28/2018</a:t>
+              <a:t>11/12/2019</a:t>
             </a:fld>
             <a:endParaRPr lang="en-US"/>
           </a:p>
@@ -653,7 +653,7 @@
             <a:fld id="{C69E31BE-431C-4F96-86FE-0099C953F73C}" type="datetimeFigureOut">
               <a:rPr lang="en-US" smtClean="0"/>
               <a:pPr/>
-              <a:t>8/28/2018</a:t>
+              <a:t>11/12/2019</a:t>
             </a:fld>
             <a:endParaRPr lang="en-US"/>
           </a:p>
@@ -823,7 +823,7 @@
             <a:fld id="{C69E31BE-431C-4F96-86FE-0099C953F73C}" type="datetimeFigureOut">
               <a:rPr lang="en-US" smtClean="0"/>
               <a:pPr/>
-              <a:t>8/28/2018</a:t>
+              <a:t>11/12/2019</a:t>
             </a:fld>
             <a:endParaRPr lang="en-US"/>
           </a:p>
@@ -1070,7 +1070,7 @@
             <a:fld id="{C69E31BE-431C-4F96-86FE-0099C953F73C}" type="datetimeFigureOut">
               <a:rPr lang="en-US" smtClean="0"/>
               <a:pPr/>
-              <a:t>8/28/2018</a:t>
+              <a:t>11/12/2019</a:t>
             </a:fld>
             <a:endParaRPr lang="en-US"/>
           </a:p>
@@ -1357,7 +1357,7 @@
             <a:fld id="{C69E31BE-431C-4F96-86FE-0099C953F73C}" type="datetimeFigureOut">
               <a:rPr lang="en-US" smtClean="0"/>
               <a:pPr/>
-              <a:t>8/28/2018</a:t>
+              <a:t>11/12/2019</a:t>
             </a:fld>
             <a:endParaRPr lang="en-US"/>
           </a:p>
@@ -1778,7 +1778,7 @@
             <a:fld id="{C69E31BE-431C-4F96-86FE-0099C953F73C}" type="datetimeFigureOut">
               <a:rPr lang="en-US" smtClean="0"/>
               <a:pPr/>
-              <a:t>8/28/2018</a:t>
+              <a:t>11/12/2019</a:t>
             </a:fld>
             <a:endParaRPr lang="en-US"/>
           </a:p>
@@ -1897,7 +1897,7 @@
             <a:fld id="{C69E31BE-431C-4F96-86FE-0099C953F73C}" type="datetimeFigureOut">
               <a:rPr lang="en-US" smtClean="0"/>
               <a:pPr/>
-              <a:t>8/28/2018</a:t>
+              <a:t>11/12/2019</a:t>
             </a:fld>
             <a:endParaRPr lang="en-US"/>
           </a:p>
@@ -1994,7 +1994,7 @@
             <a:fld id="{C69E31BE-431C-4F96-86FE-0099C953F73C}" type="datetimeFigureOut">
               <a:rPr lang="en-US" smtClean="0"/>
               <a:pPr/>
-              <a:t>8/28/2018</a:t>
+              <a:t>11/12/2019</a:t>
             </a:fld>
             <a:endParaRPr lang="en-US"/>
           </a:p>
@@ -2271,7 +2271,7 @@
             <a:fld id="{C69E31BE-431C-4F96-86FE-0099C953F73C}" type="datetimeFigureOut">
               <a:rPr lang="en-US" smtClean="0"/>
               <a:pPr/>
-              <a:t>8/28/2018</a:t>
+              <a:t>11/12/2019</a:t>
             </a:fld>
             <a:endParaRPr lang="en-US"/>
           </a:p>
@@ -2525,7 +2525,7 @@
             <a:fld id="{C69E31BE-431C-4F96-86FE-0099C953F73C}" type="datetimeFigureOut">
               <a:rPr lang="en-US" smtClean="0"/>
               <a:pPr/>
-              <a:t>8/28/2018</a:t>
+              <a:t>11/12/2019</a:t>
             </a:fld>
             <a:endParaRPr lang="en-US"/>
           </a:p>
@@ -2738,7 +2738,7 @@
             <a:fld id="{C69E31BE-431C-4F96-86FE-0099C953F73C}" type="datetimeFigureOut">
               <a:rPr lang="en-US" smtClean="0"/>
               <a:pPr/>
-              <a:t>8/28/2018</a:t>
+              <a:t>11/12/2019</a:t>
             </a:fld>
             <a:endParaRPr lang="en-US"/>
           </a:p>
@@ -3216,7 +3216,7 @@
         </p:nvCxnSpPr>
         <p:spPr>
           <a:xfrm>
-            <a:off x="952592" y="668782"/>
+            <a:off x="952592" y="165894"/>
             <a:ext cx="1115798" cy="0"/>
           </a:xfrm>
           <a:prstGeom prst="straightConnector1">
@@ -3249,7 +3249,7 @@
         </p:nvSpPr>
         <p:spPr>
           <a:xfrm>
-            <a:off x="952591" y="691496"/>
+            <a:off x="952591" y="188608"/>
             <a:ext cx="1086027" cy="541198"/>
           </a:xfrm>
           <a:prstGeom prst="rect">
@@ -3321,7 +3321,7 @@
         </p:nvSpPr>
         <p:spPr>
           <a:xfrm>
-            <a:off x="962079" y="1412007"/>
+            <a:off x="962079" y="775494"/>
             <a:ext cx="1086027" cy="628881"/>
           </a:xfrm>
           <a:prstGeom prst="rect">
@@ -3393,7 +3393,131 @@
         </p:nvCxnSpPr>
         <p:spPr>
           <a:xfrm>
-            <a:off x="952592" y="1469176"/>
+            <a:off x="952592" y="832663"/>
+            <a:ext cx="1115798" cy="0"/>
+          </a:xfrm>
+          <a:prstGeom prst="straightConnector1">
+            <a:avLst/>
+          </a:prstGeom>
+          <a:ln w="19050">
+            <a:tailEnd type="arrow"/>
+          </a:ln>
+        </p:spPr>
+        <p:style>
+          <a:lnRef idx="1">
+            <a:schemeClr val="accent1"/>
+          </a:lnRef>
+          <a:fillRef idx="0">
+            <a:schemeClr val="accent1"/>
+          </a:fillRef>
+          <a:effectRef idx="0">
+            <a:schemeClr val="accent1"/>
+          </a:effectRef>
+          <a:fontRef idx="minor">
+            <a:schemeClr val="tx1"/>
+          </a:fontRef>
+        </p:style>
+      </p:cxnSp>
+      <p:sp>
+        <p:nvSpPr>
+          <p:cNvPr id="8" name="Rectangle 7">
+            <a:extLst>
+              <a:ext uri="{FF2B5EF4-FFF2-40B4-BE49-F238E27FC236}">
+                <a16:creationId xmlns:a16="http://schemas.microsoft.com/office/drawing/2014/main" id="{D5226E56-71E3-4612-B563-318EB4B9E046}"/>
+              </a:ext>
+            </a:extLst>
+          </p:cNvPr>
+          <p:cNvSpPr/>
+          <p:nvPr/>
+        </p:nvSpPr>
+        <p:spPr>
+          <a:xfrm>
+            <a:off x="967477" y="1442013"/>
+            <a:ext cx="1086027" cy="628881"/>
+          </a:xfrm>
+          <a:prstGeom prst="rect">
+            <a:avLst/>
+          </a:prstGeom>
+          <a:noFill/>
+          <a:ln>
+            <a:noFill/>
+          </a:ln>
+        </p:spPr>
+        <p:style>
+          <a:lnRef idx="2">
+            <a:schemeClr val="accent1">
+              <a:shade val="50000"/>
+            </a:schemeClr>
+          </a:lnRef>
+          <a:fillRef idx="1">
+            <a:schemeClr val="accent1"/>
+          </a:fillRef>
+          <a:effectRef idx="0">
+            <a:schemeClr val="accent1"/>
+          </a:effectRef>
+          <a:fontRef idx="minor">
+            <a:schemeClr val="lt1"/>
+          </a:fontRef>
+        </p:style>
+        <p:txBody>
+          <a:bodyPr lIns="68589" tIns="34295" rIns="68589" bIns="34295" rtlCol="0" anchor="ctr"/>
+          <a:lstStyle/>
+          <a:p>
+            <a:pPr algn="ctr"/>
+            <a:r>
+              <a:rPr lang="en-CA" sz="1100" dirty="0">
+                <a:solidFill>
+                  <a:schemeClr val="tx1"/>
+                </a:solidFill>
+                <a:latin typeface="Arial" pitchFamily="34" charset="0"/>
+                <a:cs typeface="Arial" pitchFamily="34" charset="0"/>
+              </a:rPr>
+              <a:t>Query, Create, Update, Delete</a:t>
+            </a:r>
+            <a:br>
+              <a:rPr lang="en-CA" sz="1100" dirty="0">
+                <a:solidFill>
+                  <a:schemeClr val="tx1"/>
+                </a:solidFill>
+                <a:latin typeface="Arial" pitchFamily="34" charset="0"/>
+                <a:cs typeface="Arial" pitchFamily="34" charset="0"/>
+              </a:rPr>
+            </a:br>
+            <a:r>
+              <a:rPr lang="en-CA" sz="1100" b="1" dirty="0" err="1">
+                <a:solidFill>
+                  <a:schemeClr val="tx1"/>
+                </a:solidFill>
+                <a:latin typeface="Arial" pitchFamily="34" charset="0"/>
+                <a:cs typeface="Arial" pitchFamily="34" charset="0"/>
+              </a:rPr>
+              <a:t>CodeSystem</a:t>
+            </a:r>
+            <a:endParaRPr lang="en-CA" sz="1100" b="1" dirty="0">
+              <a:solidFill>
+                <a:schemeClr val="tx1"/>
+              </a:solidFill>
+              <a:latin typeface="Arial" pitchFamily="34" charset="0"/>
+              <a:cs typeface="Arial" pitchFamily="34" charset="0"/>
+            </a:endParaRPr>
+          </a:p>
+        </p:txBody>
+      </p:sp>
+      <p:cxnSp>
+        <p:nvCxnSpPr>
+          <p:cNvPr id="9" name="Straight Arrow Connector 8">
+            <a:extLst>
+              <a:ext uri="{FF2B5EF4-FFF2-40B4-BE49-F238E27FC236}">
+                <a16:creationId xmlns:a16="http://schemas.microsoft.com/office/drawing/2014/main" id="{8A936D26-99CD-404E-8DBD-FE8A52DD15D7}"/>
+              </a:ext>
+            </a:extLst>
+          </p:cNvPr>
+          <p:cNvCxnSpPr/>
+          <p:nvPr/>
+        </p:nvCxnSpPr>
+        <p:spPr>
+          <a:xfrm>
+            <a:off x="957990" y="1499182"/>
             <a:ext cx="1115798" cy="0"/>
           </a:xfrm>
           <a:prstGeom prst="straightConnector1">
@@ -3712,12 +3836,9 @@
 </file>
 
 <file path=customXml/item1.xml><?xml version="1.0" encoding="utf-8"?>
-<?mso-contentType ?>
-<FormTemplates xmlns="http://schemas.microsoft.com/sharepoint/v3/contenttype/forms">
-  <Display>DocumentLibraryForm</Display>
-  <Edit>DocumentLibraryForm</Edit>
-  <New>DocumentLibraryForm</New>
-</FormTemplates>
+<p:properties xmlns:p="http://schemas.microsoft.com/office/2006/metadata/properties" xmlns:xsi="http://www.w3.org/2001/XMLSchema-instance">
+  <documentManagement/>
+</p:properties>
 </file>
 
 <file path=customXml/item2.xml><?xml version="1.0" encoding="utf-8"?>
@@ -3770,15 +3891,24 @@
 </file>
 
 <file path=customXml/item3.xml><?xml version="1.0" encoding="utf-8"?>
-<p:properties xmlns:p="http://schemas.microsoft.com/office/2006/metadata/properties" xmlns:xsi="http://www.w3.org/2001/XMLSchema-instance">
-  <documentManagement/>
-</p:properties>
+<?mso-contentType ?>
+<FormTemplates xmlns="http://schemas.microsoft.com/sharepoint/v3/contenttype/forms">
+  <Display>DocumentLibraryForm</Display>
+  <Edit>DocumentLibraryForm</Edit>
+  <New>DocumentLibraryForm</New>
+</FormTemplates>
 </file>
 
 <file path=customXml/itemProps1.xml><?xml version="1.0" encoding="utf-8"?>
-<ds:datastoreItem xmlns:ds="http://schemas.openxmlformats.org/officeDocument/2006/customXml" ds:itemID="{93867DCD-913B-4BE7-B218-6A941DDB47CC}">
+<ds:datastoreItem xmlns:ds="http://schemas.openxmlformats.org/officeDocument/2006/customXml" ds:itemID="{AA05AFCB-176E-411D-8F54-3F7328DC8DF9}">
   <ds:schemaRefs>
-    <ds:schemaRef ds:uri="http://schemas.microsoft.com/sharepoint/v3/contenttype/forms"/>
+    <ds:schemaRef ds:uri="http://schemas.microsoft.com/office/2006/documentManagement/types"/>
+    <ds:schemaRef ds:uri="http://purl.org/dc/terms/"/>
+    <ds:schemaRef ds:uri="http://schemas.microsoft.com/office/2006/metadata/properties"/>
+    <ds:schemaRef ds:uri="http://purl.org/dc/dcmitype/"/>
+    <ds:schemaRef ds:uri="http://www.w3.org/XML/1998/namespace"/>
+    <ds:schemaRef ds:uri="http://schemas.openxmlformats.org/package/2006/metadata/core-properties"/>
+    <ds:schemaRef ds:uri="http://purl.org/dc/elements/1.1/"/>
   </ds:schemaRefs>
 </ds:datastoreItem>
 </file>
@@ -3799,15 +3929,9 @@
 </file>
 
 <file path=customXml/itemProps3.xml><?xml version="1.0" encoding="utf-8"?>
-<ds:datastoreItem xmlns:ds="http://schemas.openxmlformats.org/officeDocument/2006/customXml" ds:itemID="{AA05AFCB-176E-411D-8F54-3F7328DC8DF9}">
+<ds:datastoreItem xmlns:ds="http://schemas.openxmlformats.org/officeDocument/2006/customXml" ds:itemID="{93867DCD-913B-4BE7-B218-6A941DDB47CC}">
   <ds:schemaRefs>
-    <ds:schemaRef ds:uri="http://schemas.microsoft.com/office/2006/documentManagement/types"/>
-    <ds:schemaRef ds:uri="http://purl.org/dc/terms/"/>
-    <ds:schemaRef ds:uri="http://schemas.microsoft.com/office/2006/metadata/properties"/>
-    <ds:schemaRef ds:uri="http://purl.org/dc/dcmitype/"/>
-    <ds:schemaRef ds:uri="http://www.w3.org/XML/1998/namespace"/>
-    <ds:schemaRef ds:uri="http://schemas.openxmlformats.org/package/2006/metadata/core-properties"/>
-    <ds:schemaRef ds:uri="http://purl.org/dc/elements/1.1/"/>
+    <ds:schemaRef ds:uri="http://schemas.microsoft.com/sharepoint/v3/contenttype/forms"/>
   </ds:schemaRefs>
 </ds:datastoreItem>
 </file>
</xml_diff>

<commit_message>
https://jira.hl7.org/browse/FHIR-49932 - Revised capability statements https://jira.hl7.org/browse/FHIR-49446 - Updated diagrams to reflect capability statements
</commit_message>
<xml_diff>
--- a/input/images-source/sdc-form-curation.pptx
+++ b/input/images-source/sdc-form-curation.pptx
@@ -303,7 +303,7 @@
             <a:fld id="{C69E31BE-431C-4F96-86FE-0099C953F73C}" type="datetimeFigureOut">
               <a:rPr lang="en-US" smtClean="0"/>
               <a:pPr/>
-              <a:t>11/12/2019</a:t>
+              <a:t>8/13/2025</a:t>
             </a:fld>
             <a:endParaRPr lang="en-US"/>
           </a:p>
@@ -473,7 +473,7 @@
             <a:fld id="{C69E31BE-431C-4F96-86FE-0099C953F73C}" type="datetimeFigureOut">
               <a:rPr lang="en-US" smtClean="0"/>
               <a:pPr/>
-              <a:t>11/12/2019</a:t>
+              <a:t>8/13/2025</a:t>
             </a:fld>
             <a:endParaRPr lang="en-US"/>
           </a:p>
@@ -653,7 +653,7 @@
             <a:fld id="{C69E31BE-431C-4F96-86FE-0099C953F73C}" type="datetimeFigureOut">
               <a:rPr lang="en-US" smtClean="0"/>
               <a:pPr/>
-              <a:t>11/12/2019</a:t>
+              <a:t>8/13/2025</a:t>
             </a:fld>
             <a:endParaRPr lang="en-US"/>
           </a:p>
@@ -823,7 +823,7 @@
             <a:fld id="{C69E31BE-431C-4F96-86FE-0099C953F73C}" type="datetimeFigureOut">
               <a:rPr lang="en-US" smtClean="0"/>
               <a:pPr/>
-              <a:t>11/12/2019</a:t>
+              <a:t>8/13/2025</a:t>
             </a:fld>
             <a:endParaRPr lang="en-US"/>
           </a:p>
@@ -1070,7 +1070,7 @@
             <a:fld id="{C69E31BE-431C-4F96-86FE-0099C953F73C}" type="datetimeFigureOut">
               <a:rPr lang="en-US" smtClean="0"/>
               <a:pPr/>
-              <a:t>11/12/2019</a:t>
+              <a:t>8/13/2025</a:t>
             </a:fld>
             <a:endParaRPr lang="en-US"/>
           </a:p>
@@ -1357,7 +1357,7 @@
             <a:fld id="{C69E31BE-431C-4F96-86FE-0099C953F73C}" type="datetimeFigureOut">
               <a:rPr lang="en-US" smtClean="0"/>
               <a:pPr/>
-              <a:t>11/12/2019</a:t>
+              <a:t>8/13/2025</a:t>
             </a:fld>
             <a:endParaRPr lang="en-US"/>
           </a:p>
@@ -1778,7 +1778,7 @@
             <a:fld id="{C69E31BE-431C-4F96-86FE-0099C953F73C}" type="datetimeFigureOut">
               <a:rPr lang="en-US" smtClean="0"/>
               <a:pPr/>
-              <a:t>11/12/2019</a:t>
+              <a:t>8/13/2025</a:t>
             </a:fld>
             <a:endParaRPr lang="en-US"/>
           </a:p>
@@ -1897,7 +1897,7 @@
             <a:fld id="{C69E31BE-431C-4F96-86FE-0099C953F73C}" type="datetimeFigureOut">
               <a:rPr lang="en-US" smtClean="0"/>
               <a:pPr/>
-              <a:t>11/12/2019</a:t>
+              <a:t>8/13/2025</a:t>
             </a:fld>
             <a:endParaRPr lang="en-US"/>
           </a:p>
@@ -1994,7 +1994,7 @@
             <a:fld id="{C69E31BE-431C-4F96-86FE-0099C953F73C}" type="datetimeFigureOut">
               <a:rPr lang="en-US" smtClean="0"/>
               <a:pPr/>
-              <a:t>11/12/2019</a:t>
+              <a:t>8/13/2025</a:t>
             </a:fld>
             <a:endParaRPr lang="en-US"/>
           </a:p>
@@ -2271,7 +2271,7 @@
             <a:fld id="{C69E31BE-431C-4F96-86FE-0099C953F73C}" type="datetimeFigureOut">
               <a:rPr lang="en-US" smtClean="0"/>
               <a:pPr/>
-              <a:t>11/12/2019</a:t>
+              <a:t>8/13/2025</a:t>
             </a:fld>
             <a:endParaRPr lang="en-US"/>
           </a:p>
@@ -2525,7 +2525,7 @@
             <a:fld id="{C69E31BE-431C-4F96-86FE-0099C953F73C}" type="datetimeFigureOut">
               <a:rPr lang="en-US" smtClean="0"/>
               <a:pPr/>
-              <a:t>11/12/2019</a:t>
+              <a:t>8/13/2025</a:t>
             </a:fld>
             <a:endParaRPr lang="en-US"/>
           </a:p>
@@ -2738,7 +2738,7 @@
             <a:fld id="{C69E31BE-431C-4F96-86FE-0099C953F73C}" type="datetimeFigureOut">
               <a:rPr lang="en-US" smtClean="0"/>
               <a:pPr/>
-              <a:t>11/12/2019</a:t>
+              <a:t>8/13/2025</a:t>
             </a:fld>
             <a:endParaRPr lang="en-US"/>
           </a:p>
@@ -3321,7 +3321,7 @@
         </p:nvSpPr>
         <p:spPr>
           <a:xfrm>
-            <a:off x="962079" y="775494"/>
+            <a:off x="962079" y="1308894"/>
             <a:ext cx="1086027" cy="628881"/>
           </a:xfrm>
           <a:prstGeom prst="rect">
@@ -3380,8 +3380,25 @@
                 <a:latin typeface="Arial" pitchFamily="34" charset="0"/>
                 <a:cs typeface="Arial" pitchFamily="34" charset="0"/>
               </a:rPr>
-              <a:t>ValueSet</a:t>
-            </a:r>
+              <a:t>ValueSet, CodeSystem</a:t>
+            </a:r>
+            <a:r>
+              <a:rPr lang="en-CA" sz="1100" dirty="0">
+                <a:solidFill>
+                  <a:schemeClr val="tx1"/>
+                </a:solidFill>
+                <a:latin typeface="Arial" pitchFamily="34" charset="0"/>
+                <a:cs typeface="Arial" pitchFamily="34" charset="0"/>
+              </a:rPr>
+              <a:t>, etc.</a:t>
+            </a:r>
+            <a:endParaRPr lang="en-CA" sz="1100" b="1" dirty="0">
+              <a:solidFill>
+                <a:schemeClr val="tx1"/>
+              </a:solidFill>
+              <a:latin typeface="Arial" pitchFamily="34" charset="0"/>
+              <a:cs typeface="Arial" pitchFamily="34" charset="0"/>
+            </a:endParaRPr>
           </a:p>
         </p:txBody>
       </p:sp>
@@ -3393,131 +3410,7 @@
         </p:nvCxnSpPr>
         <p:spPr>
           <a:xfrm>
-            <a:off x="952592" y="832663"/>
-            <a:ext cx="1115798" cy="0"/>
-          </a:xfrm>
-          <a:prstGeom prst="straightConnector1">
-            <a:avLst/>
-          </a:prstGeom>
-          <a:ln w="19050">
-            <a:tailEnd type="arrow"/>
-          </a:ln>
-        </p:spPr>
-        <p:style>
-          <a:lnRef idx="1">
-            <a:schemeClr val="accent1"/>
-          </a:lnRef>
-          <a:fillRef idx="0">
-            <a:schemeClr val="accent1"/>
-          </a:fillRef>
-          <a:effectRef idx="0">
-            <a:schemeClr val="accent1"/>
-          </a:effectRef>
-          <a:fontRef idx="minor">
-            <a:schemeClr val="tx1"/>
-          </a:fontRef>
-        </p:style>
-      </p:cxnSp>
-      <p:sp>
-        <p:nvSpPr>
-          <p:cNvPr id="8" name="Rectangle 7">
-            <a:extLst>
-              <a:ext uri="{FF2B5EF4-FFF2-40B4-BE49-F238E27FC236}">
-                <a16:creationId xmlns:a16="http://schemas.microsoft.com/office/drawing/2014/main" id="{D5226E56-71E3-4612-B563-318EB4B9E046}"/>
-              </a:ext>
-            </a:extLst>
-          </p:cNvPr>
-          <p:cNvSpPr/>
-          <p:nvPr/>
-        </p:nvSpPr>
-        <p:spPr>
-          <a:xfrm>
-            <a:off x="967477" y="1442013"/>
-            <a:ext cx="1086027" cy="628881"/>
-          </a:xfrm>
-          <a:prstGeom prst="rect">
-            <a:avLst/>
-          </a:prstGeom>
-          <a:noFill/>
-          <a:ln>
-            <a:noFill/>
-          </a:ln>
-        </p:spPr>
-        <p:style>
-          <a:lnRef idx="2">
-            <a:schemeClr val="accent1">
-              <a:shade val="50000"/>
-            </a:schemeClr>
-          </a:lnRef>
-          <a:fillRef idx="1">
-            <a:schemeClr val="accent1"/>
-          </a:fillRef>
-          <a:effectRef idx="0">
-            <a:schemeClr val="accent1"/>
-          </a:effectRef>
-          <a:fontRef idx="minor">
-            <a:schemeClr val="lt1"/>
-          </a:fontRef>
-        </p:style>
-        <p:txBody>
-          <a:bodyPr lIns="68589" tIns="34295" rIns="68589" bIns="34295" rtlCol="0" anchor="ctr"/>
-          <a:lstStyle/>
-          <a:p>
-            <a:pPr algn="ctr"/>
-            <a:r>
-              <a:rPr lang="en-CA" sz="1100" dirty="0">
-                <a:solidFill>
-                  <a:schemeClr val="tx1"/>
-                </a:solidFill>
-                <a:latin typeface="Arial" pitchFamily="34" charset="0"/>
-                <a:cs typeface="Arial" pitchFamily="34" charset="0"/>
-              </a:rPr>
-              <a:t>Query, Create, Update, Delete</a:t>
-            </a:r>
-            <a:br>
-              <a:rPr lang="en-CA" sz="1100" dirty="0">
-                <a:solidFill>
-                  <a:schemeClr val="tx1"/>
-                </a:solidFill>
-                <a:latin typeface="Arial" pitchFamily="34" charset="0"/>
-                <a:cs typeface="Arial" pitchFamily="34" charset="0"/>
-              </a:rPr>
-            </a:br>
-            <a:r>
-              <a:rPr lang="en-CA" sz="1100" b="1" dirty="0" err="1">
-                <a:solidFill>
-                  <a:schemeClr val="tx1"/>
-                </a:solidFill>
-                <a:latin typeface="Arial" pitchFamily="34" charset="0"/>
-                <a:cs typeface="Arial" pitchFamily="34" charset="0"/>
-              </a:rPr>
-              <a:t>CodeSystem</a:t>
-            </a:r>
-            <a:endParaRPr lang="en-CA" sz="1100" b="1" dirty="0">
-              <a:solidFill>
-                <a:schemeClr val="tx1"/>
-              </a:solidFill>
-              <a:latin typeface="Arial" pitchFamily="34" charset="0"/>
-              <a:cs typeface="Arial" pitchFamily="34" charset="0"/>
-            </a:endParaRPr>
-          </a:p>
-        </p:txBody>
-      </p:sp>
-      <p:cxnSp>
-        <p:nvCxnSpPr>
-          <p:cNvPr id="9" name="Straight Arrow Connector 8">
-            <a:extLst>
-              <a:ext uri="{FF2B5EF4-FFF2-40B4-BE49-F238E27FC236}">
-                <a16:creationId xmlns:a16="http://schemas.microsoft.com/office/drawing/2014/main" id="{8A936D26-99CD-404E-8DBD-FE8A52DD15D7}"/>
-              </a:ext>
-            </a:extLst>
-          </p:cNvPr>
-          <p:cNvCxnSpPr/>
-          <p:nvPr/>
-        </p:nvCxnSpPr>
-        <p:spPr>
-          <a:xfrm>
-            <a:off x="957990" y="1499182"/>
+            <a:off x="952592" y="1156494"/>
             <a:ext cx="1115798" cy="0"/>
           </a:xfrm>
           <a:prstGeom prst="straightConnector1">
@@ -3836,9 +3729,12 @@
 </file>
 
 <file path=customXml/item1.xml><?xml version="1.0" encoding="utf-8"?>
-<p:properties xmlns:p="http://schemas.microsoft.com/office/2006/metadata/properties" xmlns:xsi="http://www.w3.org/2001/XMLSchema-instance">
-  <documentManagement/>
-</p:properties>
+<?mso-contentType ?>
+<FormTemplates xmlns="http://schemas.microsoft.com/sharepoint/v3/contenttype/forms">
+  <Display>DocumentLibraryForm</Display>
+  <Edit>DocumentLibraryForm</Edit>
+  <New>DocumentLibraryForm</New>
+</FormTemplates>
 </file>
 
 <file path=customXml/item2.xml><?xml version="1.0" encoding="utf-8"?>
@@ -3891,24 +3787,15 @@
 </file>
 
 <file path=customXml/item3.xml><?xml version="1.0" encoding="utf-8"?>
-<?mso-contentType ?>
-<FormTemplates xmlns="http://schemas.microsoft.com/sharepoint/v3/contenttype/forms">
-  <Display>DocumentLibraryForm</Display>
-  <Edit>DocumentLibraryForm</Edit>
-  <New>DocumentLibraryForm</New>
-</FormTemplates>
+<p:properties xmlns:p="http://schemas.microsoft.com/office/2006/metadata/properties" xmlns:xsi="http://www.w3.org/2001/XMLSchema-instance">
+  <documentManagement/>
+</p:properties>
 </file>
 
 <file path=customXml/itemProps1.xml><?xml version="1.0" encoding="utf-8"?>
-<ds:datastoreItem xmlns:ds="http://schemas.openxmlformats.org/officeDocument/2006/customXml" ds:itemID="{AA05AFCB-176E-411D-8F54-3F7328DC8DF9}">
+<ds:datastoreItem xmlns:ds="http://schemas.openxmlformats.org/officeDocument/2006/customXml" ds:itemID="{93867DCD-913B-4BE7-B218-6A941DDB47CC}">
   <ds:schemaRefs>
-    <ds:schemaRef ds:uri="http://schemas.microsoft.com/office/2006/documentManagement/types"/>
-    <ds:schemaRef ds:uri="http://purl.org/dc/terms/"/>
-    <ds:schemaRef ds:uri="http://schemas.microsoft.com/office/2006/metadata/properties"/>
-    <ds:schemaRef ds:uri="http://purl.org/dc/dcmitype/"/>
-    <ds:schemaRef ds:uri="http://www.w3.org/XML/1998/namespace"/>
-    <ds:schemaRef ds:uri="http://schemas.openxmlformats.org/package/2006/metadata/core-properties"/>
-    <ds:schemaRef ds:uri="http://purl.org/dc/elements/1.1/"/>
+    <ds:schemaRef ds:uri="http://schemas.microsoft.com/sharepoint/v3/contenttype/forms"/>
   </ds:schemaRefs>
 </ds:datastoreItem>
 </file>
@@ -3929,9 +3816,15 @@
 </file>
 
 <file path=customXml/itemProps3.xml><?xml version="1.0" encoding="utf-8"?>
-<ds:datastoreItem xmlns:ds="http://schemas.openxmlformats.org/officeDocument/2006/customXml" ds:itemID="{93867DCD-913B-4BE7-B218-6A941DDB47CC}">
+<ds:datastoreItem xmlns:ds="http://schemas.openxmlformats.org/officeDocument/2006/customXml" ds:itemID="{AA05AFCB-176E-411D-8F54-3F7328DC8DF9}">
   <ds:schemaRefs>
-    <ds:schemaRef ds:uri="http://schemas.microsoft.com/sharepoint/v3/contenttype/forms"/>
+    <ds:schemaRef ds:uri="http://schemas.microsoft.com/office/2006/documentManagement/types"/>
+    <ds:schemaRef ds:uri="http://purl.org/dc/terms/"/>
+    <ds:schemaRef ds:uri="http://schemas.microsoft.com/office/2006/metadata/properties"/>
+    <ds:schemaRef ds:uri="http://purl.org/dc/dcmitype/"/>
+    <ds:schemaRef ds:uri="http://www.w3.org/XML/1998/namespace"/>
+    <ds:schemaRef ds:uri="http://schemas.openxmlformats.org/package/2006/metadata/core-properties"/>
+    <ds:schemaRef ds:uri="http://purl.org/dc/elements/1.1/"/>
   </ds:schemaRefs>
 </ds:datastoreItem>
 </file>
</xml_diff>